<commit_message>
parent branches set to be transparent
</commit_message>
<xml_diff>
--- a/test_nomai/nomai_tree.pptx
+++ b/test_nomai/nomai_tree.pptx
@@ -4029,6 +4029,7 @@
                     <a:satMod val="400000"/>
                   </a:schemeClr>
                 </a:duotone>
+                <a:alphaModFix amt="0"/>
                 <a:extLst>
                   <a:ext uri="{28A0092B-C50C-407E-A947-70E740481C1C}">
                     <a14:useLocalDpi xmlns:a14="http://schemas.microsoft.com/office/drawing/2010/main" val="0"/>
@@ -4364,6 +4365,7 @@
                     <a:satMod val="400000"/>
                   </a:schemeClr>
                 </a:duotone>
+                <a:alphaModFix amt="0"/>
                 <a:extLst>
                   <a:ext uri="{28A0092B-C50C-407E-A947-70E740481C1C}">
                     <a14:useLocalDpi xmlns:a14="http://schemas.microsoft.com/office/drawing/2010/main" val="0"/>
@@ -4693,6 +4695,7 @@
                     <a:satMod val="400000"/>
                   </a:schemeClr>
                 </a:duotone>
+                <a:alphaModFix amt="0"/>
                 <a:extLst>
                   <a:ext uri="{28A0092B-C50C-407E-A947-70E740481C1C}">
                     <a14:useLocalDpi xmlns:a14="http://schemas.microsoft.com/office/drawing/2010/main" val="0"/>
@@ -4738,6 +4741,7 @@
                     <a:satMod val="400000"/>
                   </a:schemeClr>
                 </a:duotone>
+                <a:alphaModFix amt="0"/>
                 <a:extLst>
                   <a:ext uri="{28A0092B-C50C-407E-A947-70E740481C1C}">
                     <a14:useLocalDpi xmlns:a14="http://schemas.microsoft.com/office/drawing/2010/main" val="0"/>
@@ -5031,6 +5035,7 @@
                     <a:satMod val="400000"/>
                   </a:schemeClr>
                 </a:duotone>
+                <a:alphaModFix amt="0"/>
                 <a:extLst>
                   <a:ext uri="{28A0092B-C50C-407E-A947-70E740481C1C}">
                     <a14:useLocalDpi xmlns:a14="http://schemas.microsoft.com/office/drawing/2010/main" val="0"/>
@@ -5076,6 +5081,7 @@
                     <a:satMod val="400000"/>
                   </a:schemeClr>
                 </a:duotone>
+                <a:alphaModFix amt="0"/>
                 <a:extLst>
                   <a:ext uri="{28A0092B-C50C-407E-A947-70E740481C1C}">
                     <a14:useLocalDpi xmlns:a14="http://schemas.microsoft.com/office/drawing/2010/main" val="0"/>
@@ -5369,6 +5375,7 @@
                     <a:satMod val="400000"/>
                   </a:schemeClr>
                 </a:duotone>
+                <a:alphaModFix amt="0"/>
                 <a:extLst>
                   <a:ext uri="{28A0092B-C50C-407E-A947-70E740481C1C}">
                     <a14:useLocalDpi xmlns:a14="http://schemas.microsoft.com/office/drawing/2010/main" val="0"/>
@@ -5533,6 +5540,7 @@
                   <a:satMod val="400000"/>
                 </a:schemeClr>
               </a:duotone>
+              <a:alphaModFix amt="0"/>
               <a:extLst>
                 <a:ext uri="{28A0092B-C50C-407E-A947-70E740481C1C}">
                   <a14:useLocalDpi xmlns:a14="http://schemas.microsoft.com/office/drawing/2010/main" val="0"/>

</xml_diff>